<commit_message>
Final touches on programme - update learning goals slides
</commit_message>
<xml_diff>
--- a/ESS_May_2021/Wednesday_May_5th/1_Introduction/0_Learning_goals.pptx
+++ b/ESS_May_2021/Wednesday_May_5th/1_Introduction/0_Learning_goals.pptx
@@ -17513,7 +17513,7 @@
               <a:buAutoNum type="arabicPeriod" startAt="1"/>
             </a:pPr>
             <a:r>
-              <a:t>Learn basics of instrument-optimisation for your type of instrument</a:t>
+              <a:t>Learn how McStas connects with other simulation tools and optimisation packages</a:t>
             </a:r>
             <a:br/>
           </a:p>
@@ -17698,9 +17698,38 @@
           <a:chExt cx="0" cy="0"/>
         </a:xfrm>
       </p:grpSpPr>
+      <p:pic>
+        <p:nvPicPr>
+          <p:cNvPr id="299" name="Image" descr="Image"/>
+          <p:cNvPicPr>
+            <a:picLocks noChangeAspect="1"/>
+          </p:cNvPicPr>
+          <p:nvPr/>
+        </p:nvPicPr>
+        <p:blipFill>
+          <a:blip r:embed="rId2">
+            <a:extLst/>
+          </a:blip>
+          <a:stretch>
+            <a:fillRect/>
+          </a:stretch>
+        </p:blipFill>
+        <p:spPr>
+          <a:xfrm>
+            <a:off x="1325612" y="957931"/>
+            <a:ext cx="10889262" cy="5584237"/>
+          </a:xfrm>
+          <a:prstGeom prst="rect">
+            <a:avLst/>
+          </a:prstGeom>
+          <a:ln w="12700">
+            <a:miter lim="400000"/>
+          </a:ln>
+        </p:spPr>
+      </p:pic>
       <p:sp>
         <p:nvSpPr>
-          <p:cNvPr id="299" name="School programme"/>
+          <p:cNvPr id="300" name="School programme"/>
           <p:cNvSpPr txBox="1"/>
           <p:nvPr>
             <p:ph type="title"/>
@@ -17735,7 +17764,7 @@
       </p:sp>
       <p:sp>
         <p:nvSpPr>
-          <p:cNvPr id="300" name="Slide Number"/>
+          <p:cNvPr id="301" name="Slide Number"/>
           <p:cNvSpPr txBox="1"/>
           <p:nvPr>
             <p:ph type="sldNum" sz="quarter" idx="2"/>
@@ -17762,14 +17791,14 @@
       </p:sp>
       <p:pic>
         <p:nvPicPr>
-          <p:cNvPr id="301" name="Image" descr="Image"/>
+          <p:cNvPr id="302" name="Image" descr="Image"/>
           <p:cNvPicPr>
             <a:picLocks noChangeAspect="1"/>
           </p:cNvPicPr>
           <p:nvPr/>
         </p:nvPicPr>
         <p:blipFill>
-          <a:blip r:embed="rId2">
+          <a:blip r:embed="rId3">
             <a:extLst/>
           </a:blip>
           <a:srcRect l="13448" t="63875" r="52708" b="0"/>
@@ -17792,14 +17821,14 @@
       </p:pic>
       <p:pic>
         <p:nvPicPr>
-          <p:cNvPr id="302" name="Image" descr="Image"/>
+          <p:cNvPr id="303" name="Image" descr="Image"/>
           <p:cNvPicPr>
             <a:picLocks noChangeAspect="1"/>
           </p:cNvPicPr>
           <p:nvPr/>
         </p:nvPicPr>
         <p:blipFill>
-          <a:blip r:embed="rId2">
+          <a:blip r:embed="rId3">
             <a:extLst/>
           </a:blip>
           <a:srcRect l="13448" t="36801" r="52708" b="35368"/>
@@ -17822,14 +17851,14 @@
       </p:pic>
       <p:pic>
         <p:nvPicPr>
-          <p:cNvPr id="303" name="Image" descr="Image"/>
+          <p:cNvPr id="304" name="Image" descr="Image"/>
           <p:cNvPicPr>
             <a:picLocks noChangeAspect="1"/>
           </p:cNvPicPr>
           <p:nvPr/>
         </p:nvPicPr>
         <p:blipFill>
-          <a:blip r:embed="rId2">
+          <a:blip r:embed="rId3">
             <a:extLst/>
           </a:blip>
           <a:srcRect l="13448" t="7510" r="52708" b="63293"/>
@@ -17841,35 +17870,6 @@
           <a:xfrm rot="3843">
             <a:off x="11402354" y="259549"/>
             <a:ext cx="696819" cy="597075"/>
-          </a:xfrm>
-          <a:prstGeom prst="rect">
-            <a:avLst/>
-          </a:prstGeom>
-          <a:ln w="12700">
-            <a:miter lim="400000"/>
-          </a:ln>
-        </p:spPr>
-      </p:pic>
-      <p:pic>
-        <p:nvPicPr>
-          <p:cNvPr id="304" name="Image" descr="Image"/>
-          <p:cNvPicPr>
-            <a:picLocks noChangeAspect="1"/>
-          </p:cNvPicPr>
-          <p:nvPr/>
-        </p:nvPicPr>
-        <p:blipFill>
-          <a:blip r:embed="rId3">
-            <a:extLst/>
-          </a:blip>
-          <a:stretch>
-            <a:fillRect/>
-          </a:stretch>
-        </p:blipFill>
-        <p:spPr>
-          <a:xfrm>
-            <a:off x="1315312" y="957931"/>
-            <a:ext cx="10889262" cy="5584237"/>
           </a:xfrm>
           <a:prstGeom prst="rect">
             <a:avLst/>
@@ -18257,14 +18257,14 @@
       </p:sp>
       <p:sp>
         <p:nvSpPr>
-          <p:cNvPr id="316" name="Sample-lecture, including “advanced McStas grammar…   + “homework”:  Start off / work on your own instrument-project"/>
+          <p:cNvPr id="316" name="Optimising your simulation Variance reduction MCPL - connectivity with other simulation codes"/>
           <p:cNvSpPr txBox="1"/>
           <p:nvPr/>
         </p:nvSpPr>
         <p:spPr>
           <a:xfrm>
-            <a:off x="6160173" y="5373235"/>
-            <a:ext cx="4457550" cy="1136353"/>
+            <a:off x="6160173" y="5627235"/>
+            <a:ext cx="4457550" cy="679153"/>
           </a:xfrm>
           <a:prstGeom prst="rect">
             <a:avLst/>
@@ -18286,26 +18286,22 @@
           <a:p>
             <a:pPr/>
             <a:r>
-              <a:t>Sample-lecture, including “advanced McStas grammar…</a:t>
+              <a:t>Optimising your simulation</a:t>
             </a:r>
             <a:br/>
             <a:r>
-              <a:t> </a:t>
+              <a:t>Variance reduction</a:t>
             </a:r>
             <a:br/>
             <a:r>
-              <a:t>+ “homework”: </a:t>
-            </a:r>
-            <a:br/>
-            <a:r>
-              <a:t>Start off / work on your own instrument-project</a:t>
+              <a:t>MCPL - connectivity with other simulation codes</a:t>
             </a:r>
           </a:p>
         </p:txBody>
       </p:sp>
       <p:sp>
         <p:nvSpPr>
-          <p:cNvPr id="317" name="In “cookbook” sections, think ahead toward your own project:  * Which neutron source * What optics * What sample  - K.I.S.S. for now"/>
+          <p:cNvPr id="317" name="In “cookbook” sections, think ahead toward toward your own use of the code  * Which neutron source * What optics * What sample  - K.I.S.S. for now"/>
           <p:cNvSpPr/>
           <p:nvPr/>
         </p:nvSpPr>
@@ -18337,7 +18333,7 @@
           <a:p>
             <a:pPr/>
             <a:r>
-              <a:t>In “cookbook” sections, think ahead toward your own project:</a:t>
+              <a:t>In “cookbook” sections, think ahead toward toward your own use of the code</a:t>
             </a:r>
             <a:br/>
             <a:br/>
@@ -18372,15 +18368,15 @@
           <a:blip r:embed="rId2">
             <a:extLst/>
           </a:blip>
-          <a:srcRect l="0" t="0" r="66913" b="0"/>
+          <a:srcRect l="0" t="0" r="66630" b="0"/>
           <a:stretch>
             <a:fillRect/>
           </a:stretch>
         </p:blipFill>
         <p:spPr>
           <a:xfrm>
-            <a:off x="1721712" y="881731"/>
-            <a:ext cx="3602907" cy="5584237"/>
+            <a:off x="1706879" y="875062"/>
+            <a:ext cx="3617540" cy="5559438"/>
           </a:xfrm>
           <a:prstGeom prst="rect">
             <a:avLst/>
@@ -18424,6 +18420,80 @@
         </p:nvSpPr>
         <p:spPr>
           <a:xfrm>
+            <a:off x="4413786" y="3303737"/>
+            <a:ext cx="1218849" cy="765500"/>
+          </a:xfrm>
+          <a:prstGeom prst="roundRect">
+            <a:avLst>
+              <a:gd name="adj" fmla="val 24886"/>
+            </a:avLst>
+          </a:prstGeom>
+          <a:solidFill>
+            <a:srgbClr val="FFFFFF"/>
+          </a:solidFill>
+          <a:ln w="25400">
+            <a:solidFill>
+              <a:schemeClr val="accent2">
+                <a:satOff val="-15111"/>
+                <a:lumOff val="-11019"/>
+              </a:schemeClr>
+            </a:solidFill>
+          </a:ln>
+        </p:spPr>
+        <p:txBody>
+          <a:bodyPr lIns="46799" tIns="46799" rIns="46799" bIns="46799" anchor="ctr"/>
+          <a:lstStyle/>
+          <a:p>
+            <a:pPr/>
+          </a:p>
+        </p:txBody>
+      </p:sp>
+      <p:sp>
+        <p:nvSpPr>
+          <p:cNvPr id="321" name="Line"/>
+          <p:cNvSpPr/>
+          <p:nvPr/>
+        </p:nvSpPr>
+        <p:spPr>
+          <a:xfrm>
+            <a:off x="5646073" y="3528411"/>
+            <a:ext cx="419612" cy="1"/>
+          </a:xfrm>
+          <a:prstGeom prst="line">
+            <a:avLst/>
+          </a:prstGeom>
+          <a:ln w="25400">
+            <a:solidFill>
+              <a:schemeClr val="accent2">
+                <a:satOff val="-15111"/>
+                <a:lumOff val="-11019"/>
+              </a:schemeClr>
+            </a:solidFill>
+          </a:ln>
+          <a:effectLst>
+            <a:outerShdw sx="100000" sy="100000" kx="0" ky="0" algn="b" rotWithShape="0" blurRad="38100" dist="20000" dir="5400000">
+              <a:srgbClr val="000000">
+                <a:alpha val="38000"/>
+              </a:srgbClr>
+            </a:outerShdw>
+          </a:effectLst>
+        </p:spPr>
+        <p:txBody>
+          <a:bodyPr lIns="45719" rIns="45719"/>
+          <a:lstStyle/>
+          <a:p>
+            <a:pPr/>
+          </a:p>
+        </p:txBody>
+      </p:sp>
+      <p:sp>
+        <p:nvSpPr>
+          <p:cNvPr id="322" name="Rounded Rectangle"/>
+          <p:cNvSpPr/>
+          <p:nvPr/>
+        </p:nvSpPr>
+        <p:spPr>
+          <a:xfrm>
             <a:off x="4413786" y="1182837"/>
             <a:ext cx="1218849" cy="765500"/>
           </a:xfrm>
@@ -18454,7 +18524,7 @@
       </p:sp>
       <p:sp>
         <p:nvSpPr>
-          <p:cNvPr id="321" name="Line"/>
+          <p:cNvPr id="323" name="Line"/>
           <p:cNvSpPr/>
           <p:nvPr/>
         </p:nvSpPr>
@@ -18492,7 +18562,7 @@
       </p:sp>
       <p:sp>
         <p:nvSpPr>
-          <p:cNvPr id="322" name="Slide Number"/>
+          <p:cNvPr id="324" name="Slide Number"/>
           <p:cNvSpPr txBox="1"/>
           <p:nvPr>
             <p:ph type="sldNum" sz="quarter" idx="2"/>
@@ -18519,18 +18589,18 @@
       </p:sp>
       <p:sp>
         <p:nvSpPr>
-          <p:cNvPr id="323" name="Rounded Rectangle"/>
+          <p:cNvPr id="325" name="Rounded Rectangle"/>
           <p:cNvSpPr/>
           <p:nvPr/>
         </p:nvSpPr>
         <p:spPr>
           <a:xfrm>
             <a:off x="4413786" y="2203310"/>
-            <a:ext cx="1218849" cy="1860198"/>
+            <a:ext cx="1218849" cy="882353"/>
           </a:xfrm>
           <a:prstGeom prst="roundRect">
             <a:avLst>
-              <a:gd name="adj" fmla="val 15323"/>
+              <a:gd name="adj" fmla="val 21167"/>
             </a:avLst>
           </a:prstGeom>
           <a:solidFill>
@@ -18552,7 +18622,7 @@
       </p:sp>
       <p:sp>
         <p:nvSpPr>
-          <p:cNvPr id="324" name="Rounded Rectangle"/>
+          <p:cNvPr id="326" name="Rounded Rectangle"/>
           <p:cNvSpPr/>
           <p:nvPr/>
         </p:nvSpPr>
@@ -18588,13 +18658,13 @@
       </p:sp>
       <p:sp>
         <p:nvSpPr>
-          <p:cNvPr id="325" name="Line"/>
+          <p:cNvPr id="327" name="Line"/>
           <p:cNvSpPr/>
           <p:nvPr/>
         </p:nvSpPr>
         <p:spPr>
           <a:xfrm>
-            <a:off x="5646073" y="2878708"/>
+            <a:off x="5646073" y="2624708"/>
             <a:ext cx="419612" cy="1"/>
           </a:xfrm>
           <a:prstGeom prst="line">
@@ -18623,7 +18693,7 @@
       </p:sp>
       <p:sp>
         <p:nvSpPr>
-          <p:cNvPr id="326" name="Line"/>
+          <p:cNvPr id="328" name="Line"/>
           <p:cNvSpPr/>
           <p:nvPr/>
         </p:nvSpPr>
@@ -18661,14 +18731,14 @@
       </p:sp>
       <p:sp>
         <p:nvSpPr>
-          <p:cNvPr id="327" name="Lectures on polarisation  and instrument optimisation technicals"/>
+          <p:cNvPr id="329" name="Samples I, elastic scattering"/>
           <p:cNvSpPr txBox="1"/>
           <p:nvPr/>
         </p:nvSpPr>
         <p:spPr>
           <a:xfrm>
             <a:off x="6160173" y="1296535"/>
-            <a:ext cx="2958090" cy="679153"/>
+            <a:ext cx="2958090" cy="221953"/>
           </a:xfrm>
           <a:prstGeom prst="rect">
             <a:avLst/>
@@ -18690,94 +18760,8 @@
           <a:p>
             <a:pPr/>
             <a:r>
-              <a:t>Lectures on polarisation </a:t>
+              <a:t>Samples I, elastic scattering</a:t>
             </a:r>
-            <a:br/>
-            <a:r>
-              <a:t>and instrument optimisation technicals</a:t>
-            </a:r>
-          </a:p>
-        </p:txBody>
-      </p:sp>
-      <p:sp>
-        <p:nvSpPr>
-          <p:cNvPr id="328" name="Discipline-specific parallel-sessions + work-sessions.  Continue on “homework”"/>
-          <p:cNvSpPr txBox="1"/>
-          <p:nvPr/>
-        </p:nvSpPr>
-        <p:spPr>
-          <a:xfrm>
-            <a:off x="6160173" y="2757035"/>
-            <a:ext cx="2958090" cy="907753"/>
-          </a:xfrm>
-          <a:prstGeom prst="rect">
-            <a:avLst/>
-          </a:prstGeom>
-          <a:ln w="12700">
-            <a:miter lim="400000"/>
-          </a:ln>
-          <a:extLst>
-            <a:ext uri="{C572A759-6A51-4108-AA02-DFA0A04FC94B}">
-              <ma14:wrappingTextBoxFlag xmlns:ma14="http://schemas.microsoft.com/office/mac/drawingml/2011/main" val="1"/>
-            </a:ext>
-          </a:extLst>
-        </p:spPr>
-        <p:txBody>
-          <a:bodyPr lIns="0" tIns="0" rIns="0" bIns="0">
-            <a:spAutoFit/>
-          </a:bodyPr>
-          <a:lstStyle/>
-          <a:p>
-            <a:pPr/>
-            <a:r>
-              <a:t>Discipline-specific parallel-sessions + work-sessions.</a:t>
-            </a:r>
-            <a:br/>
-            <a:br/>
-            <a:r>
-              <a:t>Continue on “homework”</a:t>
-            </a:r>
-          </a:p>
-        </p:txBody>
-      </p:sp>
-      <p:sp>
-        <p:nvSpPr>
-          <p:cNvPr id="329" name="Add Mantid backend to your “homework” - or simply continue on it."/>
-          <p:cNvSpPr txBox="1"/>
-          <p:nvPr/>
-        </p:nvSpPr>
-        <p:spPr>
-          <a:xfrm>
-            <a:off x="6160173" y="5652635"/>
-            <a:ext cx="2958090" cy="907753"/>
-          </a:xfrm>
-          <a:prstGeom prst="rect">
-            <a:avLst/>
-          </a:prstGeom>
-          <a:ln w="12700">
-            <a:miter lim="400000"/>
-          </a:ln>
-          <a:extLst>
-            <a:ext uri="{C572A759-6A51-4108-AA02-DFA0A04FC94B}">
-              <ma14:wrappingTextBoxFlag xmlns:ma14="http://schemas.microsoft.com/office/mac/drawingml/2011/main" val="1"/>
-            </a:ext>
-          </a:extLst>
-        </p:spPr>
-        <p:txBody>
-          <a:bodyPr lIns="0" tIns="0" rIns="0" bIns="0">
-            <a:spAutoFit/>
-          </a:bodyPr>
-          <a:lstStyle/>
-          <a:p>
-            <a:pPr/>
-            <a:r>
-              <a:t>Add Mantid backend to your “homework” - or simply continue</a:t>
-            </a:r>
-            <a:br/>
-            <a:r>
-              <a:t>on it.</a:t>
-            </a:r>
-            <a:br/>
           </a:p>
         </p:txBody>
       </p:sp>
@@ -18857,7 +18841,7 @@
       </p:sp>
       <p:sp>
         <p:nvSpPr>
-          <p:cNvPr id="332" name="School programme - day 2"/>
+          <p:cNvPr id="332" name="School programme - day 2, samples"/>
           <p:cNvSpPr txBox="1"/>
           <p:nvPr>
             <p:ph type="title"/>
@@ -18880,7 +18864,7 @@
               <a:defRPr sz="2130"/>
             </a:pPr>
             <a:r>
-              <a:t>School programme - day 2</a:t>
+              <a:t>School programme - day 2, samples</a:t>
             </a:r>
           </a:p>
           <a:p>
@@ -18890,16 +18874,46 @@
           </a:p>
         </p:txBody>
       </p:sp>
+      <p:pic>
+        <p:nvPicPr>
+          <p:cNvPr id="333" name="Image" descr="Image"/>
+          <p:cNvPicPr>
+            <a:picLocks noChangeAspect="1"/>
+          </p:cNvPicPr>
+          <p:nvPr/>
+        </p:nvPicPr>
+        <p:blipFill>
+          <a:blip r:embed="rId2">
+            <a:extLst/>
+          </a:blip>
+          <a:srcRect l="33359" t="0" r="33359" b="0"/>
+          <a:stretch>
+            <a:fillRect/>
+          </a:stretch>
+        </p:blipFill>
+        <p:spPr>
+          <a:xfrm>
+            <a:off x="1533683" y="922887"/>
+            <a:ext cx="3607935" cy="5559438"/>
+          </a:xfrm>
+          <a:prstGeom prst="rect">
+            <a:avLst/>
+          </a:prstGeom>
+          <a:ln w="12700">
+            <a:miter lim="400000"/>
+          </a:ln>
+        </p:spPr>
+      </p:pic>
       <p:sp>
         <p:nvSpPr>
-          <p:cNvPr id="333" name="Mantid-howto, lecture and demo"/>
+          <p:cNvPr id="334" name="Samples II, inelastic scattering"/>
           <p:cNvSpPr txBox="1"/>
           <p:nvPr/>
         </p:nvSpPr>
         <p:spPr>
           <a:xfrm>
-            <a:off x="6207293" y="4718511"/>
-            <a:ext cx="1582838" cy="450553"/>
+            <a:off x="6083973" y="2513732"/>
+            <a:ext cx="2958090" cy="221953"/>
           </a:xfrm>
           <a:prstGeom prst="rect">
             <a:avLst/>
@@ -18914,43 +18928,28 @@
           </a:extLst>
         </p:spPr>
         <p:txBody>
-          <a:bodyPr wrap="none" lIns="0" tIns="0" rIns="0" bIns="0">
+          <a:bodyPr lIns="0" tIns="0" rIns="0" bIns="0">
             <a:spAutoFit/>
           </a:bodyPr>
           <a:lstStyle/>
           <a:p>
             <a:pPr/>
             <a:r>
-              <a:t>Mantid-howto,</a:t>
-            </a:r>
-            <a:br/>
-            <a:r>
-              <a:t>lecture and demo</a:t>
+              <a:t>Samples II, inelastic scattering</a:t>
             </a:r>
           </a:p>
         </p:txBody>
       </p:sp>
-      <p:pic>
-        <p:nvPicPr>
-          <p:cNvPr id="334" name="Image" descr="Image"/>
-          <p:cNvPicPr>
-            <a:picLocks noChangeAspect="1"/>
-          </p:cNvPicPr>
+      <p:sp>
+        <p:nvSpPr>
+          <p:cNvPr id="335" name="NCrystal (“Samples III”)"/>
+          <p:cNvSpPr txBox="1"/>
           <p:nvPr/>
-        </p:nvPicPr>
-        <p:blipFill>
-          <a:blip r:embed="rId2">
-            <a:extLst/>
-          </a:blip>
-          <a:srcRect l="33315" t="0" r="33315" b="0"/>
-          <a:stretch>
-            <a:fillRect/>
-          </a:stretch>
-        </p:blipFill>
+        </p:nvSpPr>
         <p:spPr>
           <a:xfrm>
-            <a:off x="1545336" y="910385"/>
-            <a:ext cx="3633691" cy="5584238"/>
+            <a:off x="6160173" y="3408780"/>
+            <a:ext cx="2958090" cy="221954"/>
           </a:xfrm>
           <a:prstGeom prst="rect">
             <a:avLst/>
@@ -18958,8 +18957,97 @@
           <a:ln w="12700">
             <a:miter lim="400000"/>
           </a:ln>
+          <a:extLst>
+            <a:ext uri="{C572A759-6A51-4108-AA02-DFA0A04FC94B}">
+              <ma14:wrappingTextBoxFlag xmlns:ma14="http://schemas.microsoft.com/office/mac/drawingml/2011/main" val="1"/>
+            </a:ext>
+          </a:extLst>
         </p:spPr>
-      </p:pic>
+        <p:txBody>
+          <a:bodyPr lIns="0" tIns="0" rIns="0" bIns="0">
+            <a:spAutoFit/>
+          </a:bodyPr>
+          <a:lstStyle/>
+          <a:p>
+            <a:pPr/>
+            <a:r>
+              <a:t>NCrystal (“Samples III”)</a:t>
+            </a:r>
+          </a:p>
+        </p:txBody>
+      </p:sp>
+      <p:sp>
+        <p:nvSpPr>
+          <p:cNvPr id="336" name="Union (“Samples IV”)"/>
+          <p:cNvSpPr txBox="1"/>
+          <p:nvPr/>
+        </p:nvSpPr>
+        <p:spPr>
+          <a:xfrm>
+            <a:off x="6160173" y="4716881"/>
+            <a:ext cx="2958090" cy="221953"/>
+          </a:xfrm>
+          <a:prstGeom prst="rect">
+            <a:avLst/>
+          </a:prstGeom>
+          <a:ln w="12700">
+            <a:miter lim="400000"/>
+          </a:ln>
+          <a:extLst>
+            <a:ext uri="{C572A759-6A51-4108-AA02-DFA0A04FC94B}">
+              <ma14:wrappingTextBoxFlag xmlns:ma14="http://schemas.microsoft.com/office/mac/drawingml/2011/main" val="1"/>
+            </a:ext>
+          </a:extLst>
+        </p:spPr>
+        <p:txBody>
+          <a:bodyPr lIns="0" tIns="0" rIns="0" bIns="0">
+            <a:spAutoFit/>
+          </a:bodyPr>
+          <a:lstStyle/>
+          <a:p>
+            <a:pPr/>
+            <a:r>
+              <a:t>Union (“Samples IV”)</a:t>
+            </a:r>
+          </a:p>
+        </p:txBody>
+      </p:sp>
+      <p:sp>
+        <p:nvSpPr>
+          <p:cNvPr id="337" name="McStasScript + Guide_bot tools"/>
+          <p:cNvSpPr txBox="1"/>
+          <p:nvPr/>
+        </p:nvSpPr>
+        <p:spPr>
+          <a:xfrm>
+            <a:off x="6160173" y="5796381"/>
+            <a:ext cx="2958090" cy="221953"/>
+          </a:xfrm>
+          <a:prstGeom prst="rect">
+            <a:avLst/>
+          </a:prstGeom>
+          <a:ln w="12700">
+            <a:miter lim="400000"/>
+          </a:ln>
+          <a:extLst>
+            <a:ext uri="{C572A759-6A51-4108-AA02-DFA0A04FC94B}">
+              <ma14:wrappingTextBoxFlag xmlns:ma14="http://schemas.microsoft.com/office/mac/drawingml/2011/main" val="1"/>
+            </a:ext>
+          </a:extLst>
+        </p:spPr>
+        <p:txBody>
+          <a:bodyPr lIns="0" tIns="0" rIns="0" bIns="0">
+            <a:spAutoFit/>
+          </a:bodyPr>
+          <a:lstStyle/>
+          <a:p>
+            <a:pPr/>
+            <a:r>
+              <a:t>McStasScript + Guide_bot tools</a:t>
+            </a:r>
+          </a:p>
+        </p:txBody>
+      </p:sp>
     </p:spTree>
   </p:cSld>
   <p:clrMapOvr>
@@ -18988,7 +19076,7 @@
       </p:grpSpPr>
       <p:sp>
         <p:nvSpPr>
-          <p:cNvPr id="336" name="Rounded Rectangle"/>
+          <p:cNvPr id="339" name="Rounded Rectangle"/>
           <p:cNvSpPr/>
           <p:nvPr/>
         </p:nvSpPr>
@@ -19024,7 +19112,7 @@
       </p:sp>
       <p:sp>
         <p:nvSpPr>
-          <p:cNvPr id="337" name="Line"/>
+          <p:cNvPr id="340" name="Line"/>
           <p:cNvSpPr/>
           <p:nvPr/>
         </p:nvSpPr>
@@ -19062,7 +19150,7 @@
       </p:sp>
       <p:sp>
         <p:nvSpPr>
-          <p:cNvPr id="338" name="Slide Number"/>
+          <p:cNvPr id="341" name="Slide Number"/>
           <p:cNvSpPr txBox="1"/>
           <p:nvPr>
             <p:ph type="sldNum" sz="quarter" idx="2"/>
@@ -19089,7 +19177,7 @@
       </p:sp>
       <p:sp>
         <p:nvSpPr>
-          <p:cNvPr id="339" name="Rounded Rectangle"/>
+          <p:cNvPr id="342" name="Rounded Rectangle"/>
           <p:cNvSpPr/>
           <p:nvPr/>
         </p:nvSpPr>
@@ -19122,7 +19210,7 @@
       </p:sp>
       <p:sp>
         <p:nvSpPr>
-          <p:cNvPr id="340" name="Rounded Rectangle"/>
+          <p:cNvPr id="343" name="Rounded Rectangle"/>
           <p:cNvSpPr/>
           <p:nvPr/>
         </p:nvSpPr>
@@ -19158,7 +19246,7 @@
       </p:sp>
       <p:sp>
         <p:nvSpPr>
-          <p:cNvPr id="341" name="Line"/>
+          <p:cNvPr id="344" name="Line"/>
           <p:cNvSpPr/>
           <p:nvPr/>
         </p:nvSpPr>
@@ -19193,7 +19281,7 @@
       </p:sp>
       <p:sp>
         <p:nvSpPr>
-          <p:cNvPr id="342" name="Line"/>
+          <p:cNvPr id="345" name="Line"/>
           <p:cNvSpPr/>
           <p:nvPr/>
         </p:nvSpPr>
@@ -19231,14 +19319,14 @@
       </p:sp>
       <p:sp>
         <p:nvSpPr>
-          <p:cNvPr id="343" name="Lecture: Union subsystem - sample environments and backgrounds…"/>
+          <p:cNvPr id="346" name="A final documentation overview, where can I find what"/>
           <p:cNvSpPr txBox="1"/>
           <p:nvPr/>
         </p:nvSpPr>
         <p:spPr>
           <a:xfrm>
-            <a:off x="6160173" y="1042535"/>
-            <a:ext cx="2958090" cy="907753"/>
+            <a:off x="6160173" y="4535035"/>
+            <a:ext cx="3621089" cy="450553"/>
           </a:xfrm>
           <a:prstGeom prst="rect">
             <a:avLst/>
@@ -19260,62 +19348,18 @@
           <a:p>
             <a:pPr/>
             <a:r>
-              <a:t>Lecture:</a:t>
+              <a:t>A final documentation overview,</a:t>
             </a:r>
             <a:br/>
             <a:r>
-              <a:t>Union subsystem - sample environments and backgrounds…</a:t>
+              <a:t>where can I find what</a:t>
             </a:r>
           </a:p>
         </p:txBody>
       </p:sp>
       <p:sp>
         <p:nvSpPr>
-          <p:cNvPr id="344" name="Continue “homework&quot; Give us feedback Ask your last in-school questions"/>
-          <p:cNvSpPr txBox="1"/>
-          <p:nvPr/>
-        </p:nvSpPr>
-        <p:spPr>
-          <a:xfrm>
-            <a:off x="6160173" y="5373235"/>
-            <a:ext cx="3621089" cy="679153"/>
-          </a:xfrm>
-          <a:prstGeom prst="rect">
-            <a:avLst/>
-          </a:prstGeom>
-          <a:ln w="12700">
-            <a:miter lim="400000"/>
-          </a:ln>
-          <a:extLst>
-            <a:ext uri="{C572A759-6A51-4108-AA02-DFA0A04FC94B}">
-              <ma14:wrappingTextBoxFlag xmlns:ma14="http://schemas.microsoft.com/office/mac/drawingml/2011/main" val="1"/>
-            </a:ext>
-          </a:extLst>
-        </p:spPr>
-        <p:txBody>
-          <a:bodyPr lIns="0" tIns="0" rIns="0" bIns="0">
-            <a:spAutoFit/>
-          </a:bodyPr>
-          <a:lstStyle/>
-          <a:p>
-            <a:pPr/>
-            <a:r>
-              <a:t>Continue “homework"</a:t>
-            </a:r>
-            <a:br/>
-            <a:r>
-              <a:t>Give us feedback</a:t>
-            </a:r>
-            <a:br/>
-            <a:r>
-              <a:t>Ask your last in-school questions</a:t>
-            </a:r>
-          </a:p>
-        </p:txBody>
-      </p:sp>
-      <p:sp>
-        <p:nvSpPr>
-          <p:cNvPr id="345" name="Rounded Rectangle"/>
+          <p:cNvPr id="347" name="Rounded Rectangle"/>
           <p:cNvSpPr/>
           <p:nvPr/>
         </p:nvSpPr>
@@ -19351,7 +19395,7 @@
       </p:sp>
       <p:sp>
         <p:nvSpPr>
-          <p:cNvPr id="346" name="Line"/>
+          <p:cNvPr id="348" name="Line"/>
           <p:cNvSpPr/>
           <p:nvPr/>
         </p:nvSpPr>
@@ -19389,7 +19433,7 @@
       </p:sp>
       <p:sp>
         <p:nvSpPr>
-          <p:cNvPr id="347" name="School programme - day 3, fancy-fancy “new stuff”"/>
+          <p:cNvPr id="349" name="School programme - day 3, fancy-fancy “new stuff”"/>
           <p:cNvSpPr txBox="1"/>
           <p:nvPr>
             <p:ph type="title"/>
@@ -19419,90 +19463,6 @@
             <a:pPr defTabSz="649223">
               <a:defRPr sz="2130"/>
             </a:pPr>
-          </a:p>
-        </p:txBody>
-      </p:sp>
-      <p:sp>
-        <p:nvSpPr>
-          <p:cNvPr id="348" name="2 x breakouts: a) Write your first component b) Port your instrument / component to McStas 3"/>
-          <p:cNvSpPr txBox="1"/>
-          <p:nvPr/>
-        </p:nvSpPr>
-        <p:spPr>
-          <a:xfrm>
-            <a:off x="6207293" y="4464511"/>
-            <a:ext cx="4383387" cy="679153"/>
-          </a:xfrm>
-          <a:prstGeom prst="rect">
-            <a:avLst/>
-          </a:prstGeom>
-          <a:ln w="12700">
-            <a:miter lim="400000"/>
-          </a:ln>
-          <a:extLst>
-            <a:ext uri="{C572A759-6A51-4108-AA02-DFA0A04FC94B}">
-              <ma14:wrappingTextBoxFlag xmlns:ma14="http://schemas.microsoft.com/office/mac/drawingml/2011/main" val="1"/>
-            </a:ext>
-          </a:extLst>
-        </p:spPr>
-        <p:txBody>
-          <a:bodyPr wrap="none" lIns="0" tIns="0" rIns="0" bIns="0">
-            <a:spAutoFit/>
-          </a:bodyPr>
-          <a:lstStyle/>
-          <a:p>
-            <a:pPr/>
-            <a:r>
-              <a:t>2 x breakouts:</a:t>
-            </a:r>
-            <a:br/>
-            <a:r>
-              <a:t>a) Write your first component</a:t>
-            </a:r>
-            <a:br/>
-            <a:r>
-              <a:t>b) Port your instrument / component to McStas 3</a:t>
-            </a:r>
-          </a:p>
-        </p:txBody>
-      </p:sp>
-      <p:sp>
-        <p:nvSpPr>
-          <p:cNvPr id="349" name="Lecture: Guide_bot, guide optimisation “robot”"/>
-          <p:cNvSpPr txBox="1"/>
-          <p:nvPr/>
-        </p:nvSpPr>
-        <p:spPr>
-          <a:xfrm>
-            <a:off x="6160173" y="2185535"/>
-            <a:ext cx="2958090" cy="679153"/>
-          </a:xfrm>
-          <a:prstGeom prst="rect">
-            <a:avLst/>
-          </a:prstGeom>
-          <a:ln w="12700">
-            <a:miter lim="400000"/>
-          </a:ln>
-          <a:extLst>
-            <a:ext uri="{C572A759-6A51-4108-AA02-DFA0A04FC94B}">
-              <ma14:wrappingTextBoxFlag xmlns:ma14="http://schemas.microsoft.com/office/mac/drawingml/2011/main" val="1"/>
-            </a:ext>
-          </a:extLst>
-        </p:spPr>
-        <p:txBody>
-          <a:bodyPr lIns="0" tIns="0" rIns="0" bIns="0">
-            <a:spAutoFit/>
-          </a:bodyPr>
-          <a:lstStyle/>
-          <a:p>
-            <a:pPr/>
-            <a:r>
-              <a:t>Lecture:</a:t>
-            </a:r>
-            <a:br/>
-            <a:r>
-              <a:t>Guide_bot, guide optimisation “robot”</a:t>
-            </a:r>
           </a:p>
         </p:txBody>
       </p:sp>
@@ -19576,14 +19536,14 @@
       </p:sp>
       <p:sp>
         <p:nvSpPr>
-          <p:cNvPr id="352" name="Lectures, speed-up your future:  Using GPU’s with RAMP or McStas 3"/>
+          <p:cNvPr id="352" name="How to write your own McStas component"/>
           <p:cNvSpPr txBox="1"/>
           <p:nvPr/>
         </p:nvSpPr>
         <p:spPr>
           <a:xfrm>
             <a:off x="6160173" y="3265035"/>
-            <a:ext cx="3735034" cy="679153"/>
+            <a:ext cx="3735034" cy="450553"/>
           </a:xfrm>
           <a:prstGeom prst="rect">
             <a:avLst/>
@@ -19605,12 +19565,7 @@
           <a:p>
             <a:pPr/>
             <a:r>
-              <a:t>Lectures, speed-up your future:</a:t>
-            </a:r>
-            <a:br/>
-            <a:br/>
-            <a:r>
-              <a:t>Using GPU’s with RAMP or McStas 3</a:t>
+              <a:t>How to write your own McStas component</a:t>
             </a:r>
           </a:p>
         </p:txBody>
@@ -19627,15 +19582,15 @@
           <a:blip r:embed="rId2">
             <a:extLst/>
           </a:blip>
-          <a:srcRect l="66520" t="0" r="0" b="0"/>
+          <a:srcRect l="66708" t="0" r="0" b="0"/>
           <a:stretch>
             <a:fillRect/>
           </a:stretch>
         </p:blipFill>
         <p:spPr>
           <a:xfrm>
-            <a:off x="1260947" y="860645"/>
-            <a:ext cx="3645617" cy="5584237"/>
+            <a:off x="1267857" y="850298"/>
+            <a:ext cx="3609125" cy="5559438"/>
           </a:xfrm>
           <a:prstGeom prst="rect">
             <a:avLst/>
@@ -19645,6 +19600,122 @@
           </a:ln>
         </p:spPr>
       </p:pic>
+      <p:sp>
+        <p:nvSpPr>
+          <p:cNvPr id="354" name="McStas + Mantid"/>
+          <p:cNvSpPr txBox="1"/>
+          <p:nvPr/>
+        </p:nvSpPr>
+        <p:spPr>
+          <a:xfrm>
+            <a:off x="6221134" y="2331585"/>
+            <a:ext cx="2958090" cy="221953"/>
+          </a:xfrm>
+          <a:prstGeom prst="rect">
+            <a:avLst/>
+          </a:prstGeom>
+          <a:ln w="12700">
+            <a:miter lim="400000"/>
+          </a:ln>
+          <a:extLst>
+            <a:ext uri="{C572A759-6A51-4108-AA02-DFA0A04FC94B}">
+              <ma14:wrappingTextBoxFlag xmlns:ma14="http://schemas.microsoft.com/office/mac/drawingml/2011/main" val="1"/>
+            </a:ext>
+          </a:extLst>
+        </p:spPr>
+        <p:txBody>
+          <a:bodyPr lIns="0" tIns="0" rIns="0" bIns="0">
+            <a:spAutoFit/>
+          </a:bodyPr>
+          <a:lstStyle/>
+          <a:p>
+            <a:pPr/>
+            <a:r>
+              <a:t>McStas + Mantid</a:t>
+            </a:r>
+          </a:p>
+        </p:txBody>
+      </p:sp>
+      <p:sp>
+        <p:nvSpPr>
+          <p:cNvPr id="355" name="Wolter optics, a little theory and a look at available models in McStas"/>
+          <p:cNvSpPr txBox="1"/>
+          <p:nvPr/>
+        </p:nvSpPr>
+        <p:spPr>
+          <a:xfrm>
+            <a:off x="6103201" y="1169535"/>
+            <a:ext cx="3735034" cy="450553"/>
+          </a:xfrm>
+          <a:prstGeom prst="rect">
+            <a:avLst/>
+          </a:prstGeom>
+          <a:ln w="12700">
+            <a:miter lim="400000"/>
+          </a:ln>
+          <a:extLst>
+            <a:ext uri="{C572A759-6A51-4108-AA02-DFA0A04FC94B}">
+              <ma14:wrappingTextBoxFlag xmlns:ma14="http://schemas.microsoft.com/office/mac/drawingml/2011/main" val="1"/>
+            </a:ext>
+          </a:extLst>
+        </p:spPr>
+        <p:txBody>
+          <a:bodyPr lIns="0" tIns="0" rIns="0" bIns="0">
+            <a:spAutoFit/>
+          </a:bodyPr>
+          <a:lstStyle/>
+          <a:p>
+            <a:pPr/>
+            <a:r>
+              <a:t>Wolter optics, a little theory and a look</a:t>
+            </a:r>
+            <a:br/>
+            <a:r>
+              <a:t>at available models in McStas</a:t>
+            </a:r>
+          </a:p>
+        </p:txBody>
+      </p:sp>
+      <p:sp>
+        <p:nvSpPr>
+          <p:cNvPr id="356" name="Open session, feedback and remaining questions"/>
+          <p:cNvSpPr txBox="1"/>
+          <p:nvPr/>
+        </p:nvSpPr>
+        <p:spPr>
+          <a:xfrm>
+            <a:off x="6124265" y="5627235"/>
+            <a:ext cx="3621088" cy="450553"/>
+          </a:xfrm>
+          <a:prstGeom prst="rect">
+            <a:avLst/>
+          </a:prstGeom>
+          <a:ln w="12700">
+            <a:miter lim="400000"/>
+          </a:ln>
+          <a:extLst>
+            <a:ext uri="{C572A759-6A51-4108-AA02-DFA0A04FC94B}">
+              <ma14:wrappingTextBoxFlag xmlns:ma14="http://schemas.microsoft.com/office/mac/drawingml/2011/main" val="1"/>
+            </a:ext>
+          </a:extLst>
+        </p:spPr>
+        <p:txBody>
+          <a:bodyPr lIns="0" tIns="0" rIns="0" bIns="0">
+            <a:spAutoFit/>
+          </a:bodyPr>
+          <a:lstStyle/>
+          <a:p>
+            <a:pPr/>
+            <a:r>
+              <a:t>Open session, feedback and remaining</a:t>
+            </a:r>
+            <a:br/>
+            <a:r>
+              <a:t>questions</a:t>
+            </a:r>
+          </a:p>
+        </p:txBody>
+      </p:sp>
     </p:spTree>
   </p:cSld>
   <p:clrMapOvr>
@@ -19673,7 +19744,7 @@
       </p:grpSpPr>
       <p:sp>
         <p:nvSpPr>
-          <p:cNvPr id="355" name="For the exercise-based work-sessions"/>
+          <p:cNvPr id="358" name="For the exercise-based work-sessions"/>
           <p:cNvSpPr txBox="1"/>
           <p:nvPr>
             <p:ph type="title"/>
@@ -19697,7 +19768,7 @@
       </p:sp>
       <p:sp>
         <p:nvSpPr>
-          <p:cNvPr id="356" name="You will benefit from working in pairs,    2 &gt; 1…"/>
+          <p:cNvPr id="359" name="You will benefit from working in pairs,    2 &gt; 1…"/>
           <p:cNvSpPr txBox="1"/>
           <p:nvPr>
             <p:ph type="body" idx="1"/>
@@ -19743,20 +19814,12 @@
               <a:t>Take turns being the “coder”                                 and the “parallel processor”</a:t>
             </a:r>
             <a:br/>
-            <a:r>
-              <a:t>( use sharing-feature of</a:t>
-            </a:r>
-            <a:br/>
-            <a:r>
-              <a:t>  the IDAaaS system )</a:t>
-            </a:r>
-            <a:br/>
           </a:p>
         </p:txBody>
       </p:sp>
       <p:sp>
         <p:nvSpPr>
-          <p:cNvPr id="357" name="Slide Number"/>
+          <p:cNvPr id="360" name="Slide Number"/>
           <p:cNvSpPr txBox="1"/>
           <p:nvPr>
             <p:ph type="sldNum" sz="quarter" idx="2"/>
@@ -19783,7 +19846,7 @@
       </p:sp>
       <p:pic>
         <p:nvPicPr>
-          <p:cNvPr id="358" name="Image" descr="Image"/>
+          <p:cNvPr id="361" name="Image" descr="Image"/>
           <p:cNvPicPr>
             <a:picLocks noChangeAspect="1"/>
           </p:cNvPicPr>
@@ -19813,7 +19876,7 @@
       </p:pic>
       <p:pic>
         <p:nvPicPr>
-          <p:cNvPr id="359" name="Image" descr="Image"/>
+          <p:cNvPr id="362" name="Image" descr="Image"/>
           <p:cNvPicPr>
             <a:picLocks noChangeAspect="1"/>
           </p:cNvPicPr>
@@ -19842,7 +19905,7 @@
       </p:pic>
       <p:pic>
         <p:nvPicPr>
-          <p:cNvPr id="360" name="Image" descr="Image"/>
+          <p:cNvPr id="363" name="Image" descr="Image"/>
           <p:cNvPicPr>
             <a:picLocks noChangeAspect="1"/>
           </p:cNvPicPr>
@@ -19897,7 +19960,7 @@
       </p:grpSpPr>
       <p:sp>
         <p:nvSpPr>
-          <p:cNvPr id="362" name="Let’s get to it!"/>
+          <p:cNvPr id="365" name="Let’s get to it!"/>
           <p:cNvSpPr txBox="1"/>
           <p:nvPr>
             <p:ph type="title"/>
@@ -19921,7 +19984,7 @@
       </p:sp>
       <p:sp>
         <p:nvSpPr>
-          <p:cNvPr id="363" name="Double-click to edit"/>
+          <p:cNvPr id="366" name="Double-click to edit"/>
           <p:cNvSpPr txBox="1"/>
           <p:nvPr>
             <p:ph type="body" idx="1"/>
@@ -19942,7 +20005,7 @@
       </p:sp>
       <p:sp>
         <p:nvSpPr>
-          <p:cNvPr id="364" name="Slide Number"/>
+          <p:cNvPr id="367" name="Slide Number"/>
           <p:cNvSpPr txBox="1"/>
           <p:nvPr>
             <p:ph type="sldNum" sz="quarter" idx="2"/>
@@ -19969,7 +20032,7 @@
       </p:sp>
       <p:pic>
         <p:nvPicPr>
-          <p:cNvPr id="365" name="Image" descr="Image"/>
+          <p:cNvPr id="368" name="Image" descr="Image"/>
           <p:cNvPicPr>
             <a:picLocks noChangeAspect="1"/>
           </p:cNvPicPr>

</xml_diff>